<commit_message>
Add First Project Update Slides
</commit_message>
<xml_diff>
--- a/Smithgall Woods Project Update 20Sep17.pptx
+++ b/Smithgall Woods Project Update 20Sep17.pptx
@@ -23,8 +23,6 @@
     <p:sldId id="280" r:id="rId17"/>
     <p:sldId id="265" r:id="rId18"/>
     <p:sldId id="264" r:id="rId19"/>
-    <p:sldId id="270" r:id="rId20"/>
-    <p:sldId id="271" r:id="rId21"/>
   </p:sldIdLst>
   <p:sldSz cx="9144000" cy="6858000" type="screen4x3"/>
   <p:notesSz cx="6858000" cy="9144000"/>
@@ -4248,11 +4246,7 @@
             </a:pPr>
             <a:r>
               <a:rPr lang="en-US" sz="3600" dirty="0" smtClean="0"/>
-              <a:t>Prevented the injected code from being displayed </a:t>
-            </a:r>
-            <a:r>
-              <a:rPr lang="en-US" sz="3600" dirty="0" smtClean="0"/>
-              <a:t>temporarily</a:t>
+              <a:t>Prevented the injected code from being displayed temporarily</a:t>
             </a:r>
           </a:p>
           <a:p>
@@ -5689,143 +5683,6 @@
 </p:sld>
 </file>
 
-<file path=ppt/slides/slide19.xml><?xml version="1.0" encoding="utf-8"?>
-<p:sld xmlns:a="http://schemas.openxmlformats.org/drawingml/2006/main" xmlns:r="http://schemas.openxmlformats.org/officeDocument/2006/relationships" xmlns:p="http://schemas.openxmlformats.org/presentationml/2006/main">
-  <p:cSld>
-    <p:spTree>
-      <p:nvGrpSpPr>
-        <p:cNvPr id="1" name=""/>
-        <p:cNvGrpSpPr/>
-        <p:nvPr/>
-      </p:nvGrpSpPr>
-      <p:grpSpPr>
-        <a:xfrm>
-          <a:off x="0" y="0"/>
-          <a:ext cx="0" cy="0"/>
-          <a:chOff x="0" y="0"/>
-          <a:chExt cx="0" cy="0"/>
-        </a:xfrm>
-      </p:grpSpPr>
-      <p:sp>
-        <p:nvSpPr>
-          <p:cNvPr id="4" name="Title 1"/>
-          <p:cNvSpPr txBox="1">
-            <a:spLocks/>
-          </p:cNvSpPr>
-          <p:nvPr/>
-        </p:nvSpPr>
-        <p:spPr>
-          <a:xfrm>
-            <a:off x="457200" y="274638"/>
-            <a:ext cx="8229600" cy="1143000"/>
-          </a:xfrm>
-          <a:prstGeom prst="rect">
-            <a:avLst/>
-          </a:prstGeom>
-        </p:spPr>
-        <p:txBody>
-          <a:bodyPr vert="horz" lIns="91440" tIns="45720" rIns="91440" bIns="45720" rtlCol="0" anchor="ctr">
-            <a:normAutofit/>
-          </a:bodyPr>
-          <a:lstStyle>
-            <a:lvl1pPr algn="ctr" defTabSz="914400" rtl="0" eaLnBrk="1" latinLnBrk="0" hangingPunct="1">
-              <a:spcBef>
-                <a:spcPct val="0"/>
-              </a:spcBef>
-              <a:buNone/>
-              <a:defRPr sz="4400" kern="1200">
-                <a:solidFill>
-                  <a:schemeClr val="tx1"/>
-                </a:solidFill>
-                <a:latin typeface="+mj-lt"/>
-                <a:ea typeface="+mj-ea"/>
-                <a:cs typeface="+mj-cs"/>
-              </a:defRPr>
-            </a:lvl1pPr>
-          </a:lstStyle>
-          <a:p>
-            <a:r>
-              <a:rPr lang="en-US" b="1" dirty="0" smtClean="0"/>
-              <a:t>Site Pages</a:t>
-            </a:r>
-            <a:endParaRPr lang="en-US" b="1" dirty="0"/>
-          </a:p>
-        </p:txBody>
-      </p:sp>
-      <p:pic>
-        <p:nvPicPr>
-          <p:cNvPr id="1027" name="Picture 3"/>
-          <p:cNvPicPr>
-            <a:picLocks noChangeAspect="1" noChangeArrowheads="1"/>
-          </p:cNvPicPr>
-          <p:nvPr/>
-        </p:nvPicPr>
-        <p:blipFill>
-          <a:blip r:embed="rId2">
-            <a:extLst>
-              <a:ext uri="{28A0092B-C50C-407E-A947-70E740481C1C}">
-                <a14:useLocalDpi xmlns:a14="http://schemas.microsoft.com/office/drawing/2010/main" val="0"/>
-              </a:ext>
-            </a:extLst>
-          </a:blip>
-          <a:srcRect/>
-          <a:stretch>
-            <a:fillRect/>
-          </a:stretch>
-        </p:blipFill>
-        <p:spPr bwMode="auto">
-          <a:xfrm>
-            <a:off x="76200" y="1494482"/>
-            <a:ext cx="8915399" cy="5363518"/>
-          </a:xfrm>
-          <a:prstGeom prst="rect">
-            <a:avLst/>
-          </a:prstGeom>
-          <a:noFill/>
-          <a:ln>
-            <a:noFill/>
-          </a:ln>
-          <a:extLst>
-            <a:ext uri="{909E8E84-426E-40DD-AFC4-6F175D3DCCD1}">
-              <a14:hiddenFill xmlns:a14="http://schemas.microsoft.com/office/drawing/2010/main">
-                <a:solidFill>
-                  <a:schemeClr val="accent1"/>
-                </a:solidFill>
-              </a14:hiddenFill>
-            </a:ext>
-            <a:ext uri="{91240B29-F687-4F45-9708-019B960494DF}">
-              <a14:hiddenLine xmlns:a14="http://schemas.microsoft.com/office/drawing/2010/main" w="9525">
-                <a:solidFill>
-                  <a:schemeClr val="tx1"/>
-                </a:solidFill>
-                <a:miter lim="800000"/>
-                <a:headEnd/>
-                <a:tailEnd/>
-              </a14:hiddenLine>
-            </a:ext>
-          </a:extLst>
-        </p:spPr>
-      </p:pic>
-    </p:spTree>
-    <p:extLst>
-      <p:ext uri="{BB962C8B-B14F-4D97-AF65-F5344CB8AC3E}">
-        <p14:creationId xmlns:p14="http://schemas.microsoft.com/office/powerpoint/2010/main" val="190782481"/>
-      </p:ext>
-    </p:extLst>
-  </p:cSld>
-  <p:clrMapOvr>
-    <a:masterClrMapping/>
-  </p:clrMapOvr>
-  <p:timing>
-    <p:tnLst>
-      <p:par>
-        <p:cTn id="1" dur="indefinite" restart="never" nodeType="tmRoot"/>
-      </p:par>
-    </p:tnLst>
-  </p:timing>
-</p:sld>
-</file>
-
 <file path=ppt/slides/slide2.xml><?xml version="1.0" encoding="utf-8"?>
 <p:sld xmlns:a="http://schemas.openxmlformats.org/drawingml/2006/main" xmlns:r="http://schemas.openxmlformats.org/officeDocument/2006/relationships" xmlns:p="http://schemas.openxmlformats.org/presentationml/2006/main">
   <p:cSld>
@@ -6020,143 +5877,6 @@
     <p:extLst>
       <p:ext uri="{BB962C8B-B14F-4D97-AF65-F5344CB8AC3E}">
         <p14:creationId xmlns:p14="http://schemas.microsoft.com/office/powerpoint/2010/main" val="3385495365"/>
-      </p:ext>
-    </p:extLst>
-  </p:cSld>
-  <p:clrMapOvr>
-    <a:masterClrMapping/>
-  </p:clrMapOvr>
-  <p:timing>
-    <p:tnLst>
-      <p:par>
-        <p:cTn id="1" dur="indefinite" restart="never" nodeType="tmRoot"/>
-      </p:par>
-    </p:tnLst>
-  </p:timing>
-</p:sld>
-</file>
-
-<file path=ppt/slides/slide20.xml><?xml version="1.0" encoding="utf-8"?>
-<p:sld xmlns:a="http://schemas.openxmlformats.org/drawingml/2006/main" xmlns:r="http://schemas.openxmlformats.org/officeDocument/2006/relationships" xmlns:p="http://schemas.openxmlformats.org/presentationml/2006/main">
-  <p:cSld>
-    <p:spTree>
-      <p:nvGrpSpPr>
-        <p:cNvPr id="1" name=""/>
-        <p:cNvGrpSpPr/>
-        <p:nvPr/>
-      </p:nvGrpSpPr>
-      <p:grpSpPr>
-        <a:xfrm>
-          <a:off x="0" y="0"/>
-          <a:ext cx="0" cy="0"/>
-          <a:chOff x="0" y="0"/>
-          <a:chExt cx="0" cy="0"/>
-        </a:xfrm>
-      </p:grpSpPr>
-      <p:sp>
-        <p:nvSpPr>
-          <p:cNvPr id="4" name="Title 1"/>
-          <p:cNvSpPr txBox="1">
-            <a:spLocks/>
-          </p:cNvSpPr>
-          <p:nvPr/>
-        </p:nvSpPr>
-        <p:spPr>
-          <a:xfrm>
-            <a:off x="457200" y="274638"/>
-            <a:ext cx="8229600" cy="1143000"/>
-          </a:xfrm>
-          <a:prstGeom prst="rect">
-            <a:avLst/>
-          </a:prstGeom>
-        </p:spPr>
-        <p:txBody>
-          <a:bodyPr vert="horz" lIns="91440" tIns="45720" rIns="91440" bIns="45720" rtlCol="0" anchor="ctr">
-            <a:normAutofit/>
-          </a:bodyPr>
-          <a:lstStyle>
-            <a:lvl1pPr algn="ctr" defTabSz="914400" rtl="0" eaLnBrk="1" latinLnBrk="0" hangingPunct="1">
-              <a:spcBef>
-                <a:spcPct val="0"/>
-              </a:spcBef>
-              <a:buNone/>
-              <a:defRPr sz="4400" kern="1200">
-                <a:solidFill>
-                  <a:schemeClr val="tx1"/>
-                </a:solidFill>
-                <a:latin typeface="+mj-lt"/>
-                <a:ea typeface="+mj-ea"/>
-                <a:cs typeface="+mj-cs"/>
-              </a:defRPr>
-            </a:lvl1pPr>
-          </a:lstStyle>
-          <a:p>
-            <a:r>
-              <a:rPr lang="en-US" b="1" dirty="0" smtClean="0"/>
-              <a:t>Volunteer Hours Log Page</a:t>
-            </a:r>
-            <a:endParaRPr lang="en-US" b="1" dirty="0"/>
-          </a:p>
-        </p:txBody>
-      </p:sp>
-      <p:pic>
-        <p:nvPicPr>
-          <p:cNvPr id="1026" name="Picture 2"/>
-          <p:cNvPicPr>
-            <a:picLocks noChangeAspect="1" noChangeArrowheads="1"/>
-          </p:cNvPicPr>
-          <p:nvPr/>
-        </p:nvPicPr>
-        <p:blipFill>
-          <a:blip r:embed="rId2">
-            <a:extLst>
-              <a:ext uri="{28A0092B-C50C-407E-A947-70E740481C1C}">
-                <a14:useLocalDpi xmlns:a14="http://schemas.microsoft.com/office/drawing/2010/main" val="0"/>
-              </a:ext>
-            </a:extLst>
-          </a:blip>
-          <a:srcRect/>
-          <a:stretch>
-            <a:fillRect/>
-          </a:stretch>
-        </p:blipFill>
-        <p:spPr bwMode="auto">
-          <a:xfrm>
-            <a:off x="304800" y="1524000"/>
-            <a:ext cx="8539569" cy="5334000"/>
-          </a:xfrm>
-          <a:prstGeom prst="rect">
-            <a:avLst/>
-          </a:prstGeom>
-          <a:noFill/>
-          <a:ln>
-            <a:noFill/>
-          </a:ln>
-          <a:extLst>
-            <a:ext uri="{909E8E84-426E-40DD-AFC4-6F175D3DCCD1}">
-              <a14:hiddenFill xmlns:a14="http://schemas.microsoft.com/office/drawing/2010/main">
-                <a:solidFill>
-                  <a:schemeClr val="accent1"/>
-                </a:solidFill>
-              </a14:hiddenFill>
-            </a:ext>
-            <a:ext uri="{91240B29-F687-4F45-9708-019B960494DF}">
-              <a14:hiddenLine xmlns:a14="http://schemas.microsoft.com/office/drawing/2010/main" w="9525">
-                <a:solidFill>
-                  <a:schemeClr val="tx1"/>
-                </a:solidFill>
-                <a:miter lim="800000"/>
-                <a:headEnd/>
-                <a:tailEnd/>
-              </a14:hiddenLine>
-            </a:ext>
-          </a:extLst>
-        </p:spPr>
-      </p:pic>
-    </p:spTree>
-    <p:extLst>
-      <p:ext uri="{BB962C8B-B14F-4D97-AF65-F5344CB8AC3E}">
-        <p14:creationId xmlns:p14="http://schemas.microsoft.com/office/powerpoint/2010/main" val="831991973"/>
       </p:ext>
     </p:extLst>
   </p:cSld>

</xml_diff>

<commit_message>
Rearrange bullet points on slide 5
</commit_message>
<xml_diff>
--- a/Smithgall Woods Project Update 20Sep17.pptx
+++ b/Smithgall Woods Project Update 20Sep17.pptx
@@ -121,6 +121,22 @@
       </a:defRPr>
     </a:lvl9pPr>
   </p:defaultTextStyle>
+  <p:extLst>
+    <p:ext uri="{EFAFB233-063F-42B5-8137-9DF3F51BA10A}">
+      <p15:sldGuideLst xmlns:p15="http://schemas.microsoft.com/office/powerpoint/2012/main">
+        <p15:guide id="1" orient="horz" pos="2160">
+          <p15:clr>
+            <a:srgbClr val="A4A3A4"/>
+          </p15:clr>
+        </p15:guide>
+        <p15:guide id="2" pos="2880">
+          <p15:clr>
+            <a:srgbClr val="A4A3A4"/>
+          </p15:clr>
+        </p15:guide>
+      </p15:sldGuideLst>
+    </p:ext>
+  </p:extLst>
 </p:presentation>
 </file>
 
@@ -162,10 +178,9 @@
           <a:lstStyle/>
           <a:p>
             <a:r>
-              <a:rPr lang="en-US" smtClean="0"/>
+              <a:rPr lang="en-US"/>
               <a:t>Click to edit Master title style</a:t>
             </a:r>
-            <a:endParaRPr lang="en-US"/>
           </a:p>
         </p:txBody>
       </p:sp>
@@ -281,10 +296,9 @@
           </a:lstStyle>
           <a:p>
             <a:r>
-              <a:rPr lang="en-US" smtClean="0"/>
+              <a:rPr lang="en-US"/>
               <a:t>Click to edit Master subtitle style</a:t>
             </a:r>
-            <a:endParaRPr lang="en-US"/>
           </a:p>
         </p:txBody>
       </p:sp>
@@ -404,13 +418,6 @@
   <p:clrMapOvr>
     <a:masterClrMapping/>
   </p:clrMapOvr>
-  <p:timing>
-    <p:tnLst>
-      <p:par>
-        <p:cTn id="1" dur="indefinite" restart="never" nodeType="tmRoot"/>
-      </p:par>
-    </p:tnLst>
-  </p:timing>
 </p:sldLayout>
 </file>
 
@@ -447,10 +454,9 @@
           <a:lstStyle/>
           <a:p>
             <a:r>
-              <a:rPr lang="en-US" smtClean="0"/>
+              <a:rPr lang="en-US"/>
               <a:t>Click to edit Master title style</a:t>
             </a:r>
-            <a:endParaRPr lang="en-US"/>
           </a:p>
         </p:txBody>
       </p:sp>
@@ -471,38 +477,37 @@
           <a:p>
             <a:pPr lvl="0"/>
             <a:r>
-              <a:rPr lang="en-US" smtClean="0"/>
+              <a:rPr lang="en-US"/>
               <a:t>Click to edit Master text styles</a:t>
             </a:r>
           </a:p>
           <a:p>
             <a:pPr lvl="1"/>
             <a:r>
-              <a:rPr lang="en-US" smtClean="0"/>
+              <a:rPr lang="en-US"/>
               <a:t>Second level</a:t>
             </a:r>
           </a:p>
           <a:p>
             <a:pPr lvl="2"/>
             <a:r>
-              <a:rPr lang="en-US" smtClean="0"/>
+              <a:rPr lang="en-US"/>
               <a:t>Third level</a:t>
             </a:r>
           </a:p>
           <a:p>
             <a:pPr lvl="3"/>
             <a:r>
-              <a:rPr lang="en-US" smtClean="0"/>
+              <a:rPr lang="en-US"/>
               <a:t>Fourth level</a:t>
             </a:r>
           </a:p>
           <a:p>
             <a:pPr lvl="4"/>
             <a:r>
-              <a:rPr lang="en-US" smtClean="0"/>
+              <a:rPr lang="en-US"/>
               <a:t>Fifth level</a:t>
             </a:r>
-            <a:endParaRPr lang="en-US"/>
           </a:p>
         </p:txBody>
       </p:sp>
@@ -581,13 +586,6 @@
   <p:clrMapOvr>
     <a:masterClrMapping/>
   </p:clrMapOvr>
-  <p:timing>
-    <p:tnLst>
-      <p:par>
-        <p:cTn id="1" dur="indefinite" restart="never" nodeType="tmRoot"/>
-      </p:par>
-    </p:tnLst>
-  </p:timing>
 </p:sldLayout>
 </file>
 
@@ -629,10 +627,9 @@
           <a:lstStyle/>
           <a:p>
             <a:r>
-              <a:rPr lang="en-US" smtClean="0"/>
+              <a:rPr lang="en-US"/>
               <a:t>Click to edit Master title style</a:t>
             </a:r>
-            <a:endParaRPr lang="en-US"/>
           </a:p>
         </p:txBody>
       </p:sp>
@@ -658,38 +655,37 @@
           <a:p>
             <a:pPr lvl="0"/>
             <a:r>
-              <a:rPr lang="en-US" smtClean="0"/>
+              <a:rPr lang="en-US"/>
               <a:t>Click to edit Master text styles</a:t>
             </a:r>
           </a:p>
           <a:p>
             <a:pPr lvl="1"/>
             <a:r>
-              <a:rPr lang="en-US" smtClean="0"/>
+              <a:rPr lang="en-US"/>
               <a:t>Second level</a:t>
             </a:r>
           </a:p>
           <a:p>
             <a:pPr lvl="2"/>
             <a:r>
-              <a:rPr lang="en-US" smtClean="0"/>
+              <a:rPr lang="en-US"/>
               <a:t>Third level</a:t>
             </a:r>
           </a:p>
           <a:p>
             <a:pPr lvl="3"/>
             <a:r>
-              <a:rPr lang="en-US" smtClean="0"/>
+              <a:rPr lang="en-US"/>
               <a:t>Fourth level</a:t>
             </a:r>
           </a:p>
           <a:p>
             <a:pPr lvl="4"/>
             <a:r>
-              <a:rPr lang="en-US" smtClean="0"/>
+              <a:rPr lang="en-US"/>
               <a:t>Fifth level</a:t>
             </a:r>
-            <a:endParaRPr lang="en-US"/>
           </a:p>
         </p:txBody>
       </p:sp>
@@ -768,13 +764,6 @@
   <p:clrMapOvr>
     <a:masterClrMapping/>
   </p:clrMapOvr>
-  <p:timing>
-    <p:tnLst>
-      <p:par>
-        <p:cTn id="1" dur="indefinite" restart="never" nodeType="tmRoot"/>
-      </p:par>
-    </p:tnLst>
-  </p:timing>
 </p:sldLayout>
 </file>
 
@@ -811,10 +800,9 @@
           <a:lstStyle/>
           <a:p>
             <a:r>
-              <a:rPr lang="en-US" smtClean="0"/>
+              <a:rPr lang="en-US"/>
               <a:t>Click to edit Master title style</a:t>
             </a:r>
-            <a:endParaRPr lang="en-US"/>
           </a:p>
         </p:txBody>
       </p:sp>
@@ -835,38 +823,37 @@
           <a:p>
             <a:pPr lvl="0"/>
             <a:r>
-              <a:rPr lang="en-US" smtClean="0"/>
+              <a:rPr lang="en-US"/>
               <a:t>Click to edit Master text styles</a:t>
             </a:r>
           </a:p>
           <a:p>
             <a:pPr lvl="1"/>
             <a:r>
-              <a:rPr lang="en-US" smtClean="0"/>
+              <a:rPr lang="en-US"/>
               <a:t>Second level</a:t>
             </a:r>
           </a:p>
           <a:p>
             <a:pPr lvl="2"/>
             <a:r>
-              <a:rPr lang="en-US" smtClean="0"/>
+              <a:rPr lang="en-US"/>
               <a:t>Third level</a:t>
             </a:r>
           </a:p>
           <a:p>
             <a:pPr lvl="3"/>
             <a:r>
-              <a:rPr lang="en-US" smtClean="0"/>
+              <a:rPr lang="en-US"/>
               <a:t>Fourth level</a:t>
             </a:r>
           </a:p>
           <a:p>
             <a:pPr lvl="4"/>
             <a:r>
-              <a:rPr lang="en-US" smtClean="0"/>
+              <a:rPr lang="en-US"/>
               <a:t>Fifth level</a:t>
             </a:r>
-            <a:endParaRPr lang="en-US"/>
           </a:p>
         </p:txBody>
       </p:sp>
@@ -986,13 +973,6 @@
   <p:clrMapOvr>
     <a:masterClrMapping/>
   </p:clrMapOvr>
-  <p:timing>
-    <p:tnLst>
-      <p:par>
-        <p:cTn id="1" dur="indefinite" restart="never" nodeType="tmRoot"/>
-      </p:par>
-    </p:tnLst>
-  </p:timing>
 </p:sldLayout>
 </file>
 
@@ -1038,10 +1018,9 @@
           </a:lstStyle>
           <a:p>
             <a:r>
-              <a:rPr lang="en-US" smtClean="0"/>
+              <a:rPr lang="en-US"/>
               <a:t>Click to edit Master title style</a:t>
             </a:r>
-            <a:endParaRPr lang="en-US"/>
           </a:p>
         </p:txBody>
       </p:sp>
@@ -1158,7 +1137,7 @@
           <a:p>
             <a:pPr lvl="0"/>
             <a:r>
-              <a:rPr lang="en-US" smtClean="0"/>
+              <a:rPr lang="en-US"/>
               <a:t>Click to edit Master text styles</a:t>
             </a:r>
           </a:p>
@@ -1239,13 +1218,6 @@
   <p:clrMapOvr>
     <a:masterClrMapping/>
   </p:clrMapOvr>
-  <p:timing>
-    <p:tnLst>
-      <p:par>
-        <p:cTn id="1" dur="indefinite" restart="never" nodeType="tmRoot"/>
-      </p:par>
-    </p:tnLst>
-  </p:timing>
 </p:sldLayout>
 </file>
 
@@ -1282,10 +1254,9 @@
           <a:lstStyle/>
           <a:p>
             <a:r>
-              <a:rPr lang="en-US" smtClean="0"/>
+              <a:rPr lang="en-US"/>
               <a:t>Click to edit Master title style</a:t>
             </a:r>
-            <a:endParaRPr lang="en-US"/>
           </a:p>
         </p:txBody>
       </p:sp>
@@ -1339,38 +1310,37 @@
           <a:p>
             <a:pPr lvl="0"/>
             <a:r>
-              <a:rPr lang="en-US" smtClean="0"/>
+              <a:rPr lang="en-US"/>
               <a:t>Click to edit Master text styles</a:t>
             </a:r>
           </a:p>
           <a:p>
             <a:pPr lvl="1"/>
             <a:r>
-              <a:rPr lang="en-US" smtClean="0"/>
+              <a:rPr lang="en-US"/>
               <a:t>Second level</a:t>
             </a:r>
           </a:p>
           <a:p>
             <a:pPr lvl="2"/>
             <a:r>
-              <a:rPr lang="en-US" smtClean="0"/>
+              <a:rPr lang="en-US"/>
               <a:t>Third level</a:t>
             </a:r>
           </a:p>
           <a:p>
             <a:pPr lvl="3"/>
             <a:r>
-              <a:rPr lang="en-US" smtClean="0"/>
+              <a:rPr lang="en-US"/>
               <a:t>Fourth level</a:t>
             </a:r>
           </a:p>
           <a:p>
             <a:pPr lvl="4"/>
             <a:r>
-              <a:rPr lang="en-US" smtClean="0"/>
+              <a:rPr lang="en-US"/>
               <a:t>Fifth level</a:t>
             </a:r>
-            <a:endParaRPr lang="en-US"/>
           </a:p>
         </p:txBody>
       </p:sp>
@@ -1424,38 +1394,37 @@
           <a:p>
             <a:pPr lvl="0"/>
             <a:r>
-              <a:rPr lang="en-US" smtClean="0"/>
+              <a:rPr lang="en-US"/>
               <a:t>Click to edit Master text styles</a:t>
             </a:r>
           </a:p>
           <a:p>
             <a:pPr lvl="1"/>
             <a:r>
-              <a:rPr lang="en-US" smtClean="0"/>
+              <a:rPr lang="en-US"/>
               <a:t>Second level</a:t>
             </a:r>
           </a:p>
           <a:p>
             <a:pPr lvl="2"/>
             <a:r>
-              <a:rPr lang="en-US" smtClean="0"/>
+              <a:rPr lang="en-US"/>
               <a:t>Third level</a:t>
             </a:r>
           </a:p>
           <a:p>
             <a:pPr lvl="3"/>
             <a:r>
-              <a:rPr lang="en-US" smtClean="0"/>
+              <a:rPr lang="en-US"/>
               <a:t>Fourth level</a:t>
             </a:r>
           </a:p>
           <a:p>
             <a:pPr lvl="4"/>
             <a:r>
-              <a:rPr lang="en-US" smtClean="0"/>
+              <a:rPr lang="en-US"/>
               <a:t>Fifth level</a:t>
             </a:r>
-            <a:endParaRPr lang="en-US"/>
           </a:p>
         </p:txBody>
       </p:sp>
@@ -1534,13 +1503,6 @@
   <p:clrMapOvr>
     <a:masterClrMapping/>
   </p:clrMapOvr>
-  <p:timing>
-    <p:tnLst>
-      <p:par>
-        <p:cTn id="1" dur="indefinite" restart="never" nodeType="tmRoot"/>
-      </p:par>
-    </p:tnLst>
-  </p:timing>
 </p:sldLayout>
 </file>
 
@@ -1581,10 +1543,9 @@
           </a:lstStyle>
           <a:p>
             <a:r>
-              <a:rPr lang="en-US" smtClean="0"/>
+              <a:rPr lang="en-US"/>
               <a:t>Click to edit Master title style</a:t>
             </a:r>
-            <a:endParaRPr lang="en-US"/>
           </a:p>
         </p:txBody>
       </p:sp>
@@ -1647,7 +1608,7 @@
           <a:p>
             <a:pPr lvl="0"/>
             <a:r>
-              <a:rPr lang="en-US" smtClean="0"/>
+              <a:rPr lang="en-US"/>
               <a:t>Click to edit Master text styles</a:t>
             </a:r>
           </a:p>
@@ -1703,38 +1664,37 @@
           <a:p>
             <a:pPr lvl="0"/>
             <a:r>
-              <a:rPr lang="en-US" smtClean="0"/>
+              <a:rPr lang="en-US"/>
               <a:t>Click to edit Master text styles</a:t>
             </a:r>
           </a:p>
           <a:p>
             <a:pPr lvl="1"/>
             <a:r>
-              <a:rPr lang="en-US" smtClean="0"/>
+              <a:rPr lang="en-US"/>
               <a:t>Second level</a:t>
             </a:r>
           </a:p>
           <a:p>
             <a:pPr lvl="2"/>
             <a:r>
-              <a:rPr lang="en-US" smtClean="0"/>
+              <a:rPr lang="en-US"/>
               <a:t>Third level</a:t>
             </a:r>
           </a:p>
           <a:p>
             <a:pPr lvl="3"/>
             <a:r>
-              <a:rPr lang="en-US" smtClean="0"/>
+              <a:rPr lang="en-US"/>
               <a:t>Fourth level</a:t>
             </a:r>
           </a:p>
           <a:p>
             <a:pPr lvl="4"/>
             <a:r>
-              <a:rPr lang="en-US" smtClean="0"/>
+              <a:rPr lang="en-US"/>
               <a:t>Fifth level</a:t>
             </a:r>
-            <a:endParaRPr lang="en-US"/>
           </a:p>
         </p:txBody>
       </p:sp>
@@ -1797,7 +1757,7 @@
           <a:p>
             <a:pPr lvl="0"/>
             <a:r>
-              <a:rPr lang="en-US" smtClean="0"/>
+              <a:rPr lang="en-US"/>
               <a:t>Click to edit Master text styles</a:t>
             </a:r>
           </a:p>
@@ -1853,38 +1813,37 @@
           <a:p>
             <a:pPr lvl="0"/>
             <a:r>
-              <a:rPr lang="en-US" smtClean="0"/>
+              <a:rPr lang="en-US"/>
               <a:t>Click to edit Master text styles</a:t>
             </a:r>
           </a:p>
           <a:p>
             <a:pPr lvl="1"/>
             <a:r>
-              <a:rPr lang="en-US" smtClean="0"/>
+              <a:rPr lang="en-US"/>
               <a:t>Second level</a:t>
             </a:r>
           </a:p>
           <a:p>
             <a:pPr lvl="2"/>
             <a:r>
-              <a:rPr lang="en-US" smtClean="0"/>
+              <a:rPr lang="en-US"/>
               <a:t>Third level</a:t>
             </a:r>
           </a:p>
           <a:p>
             <a:pPr lvl="3"/>
             <a:r>
-              <a:rPr lang="en-US" smtClean="0"/>
+              <a:rPr lang="en-US"/>
               <a:t>Fourth level</a:t>
             </a:r>
           </a:p>
           <a:p>
             <a:pPr lvl="4"/>
             <a:r>
-              <a:rPr lang="en-US" smtClean="0"/>
+              <a:rPr lang="en-US"/>
               <a:t>Fifth level</a:t>
             </a:r>
-            <a:endParaRPr lang="en-US"/>
           </a:p>
         </p:txBody>
       </p:sp>
@@ -1999,10 +1958,9 @@
           <a:lstStyle/>
           <a:p>
             <a:r>
-              <a:rPr lang="en-US" smtClean="0"/>
+              <a:rPr lang="en-US"/>
               <a:t>Click to edit Master title style</a:t>
             </a:r>
-            <a:endParaRPr lang="en-US"/>
           </a:p>
         </p:txBody>
       </p:sp>
@@ -2081,13 +2039,6 @@
   <p:clrMapOvr>
     <a:masterClrMapping/>
   </p:clrMapOvr>
-  <p:timing>
-    <p:tnLst>
-      <p:par>
-        <p:cTn id="1" dur="indefinite" restart="never" nodeType="tmRoot"/>
-      </p:par>
-    </p:tnLst>
-  </p:timing>
 </p:sldLayout>
 </file>
 
@@ -2183,13 +2134,6 @@
   <p:clrMapOvr>
     <a:masterClrMapping/>
   </p:clrMapOvr>
-  <p:timing>
-    <p:tnLst>
-      <p:par>
-        <p:cTn id="1" dur="indefinite" restart="never" nodeType="tmRoot"/>
-      </p:par>
-    </p:tnLst>
-  </p:timing>
 </p:sldLayout>
 </file>
 
@@ -2235,10 +2179,9 @@
           </a:lstStyle>
           <a:p>
             <a:r>
-              <a:rPr lang="en-US" smtClean="0"/>
+              <a:rPr lang="en-US"/>
               <a:t>Click to edit Master title style</a:t>
             </a:r>
-            <a:endParaRPr lang="en-US"/>
           </a:p>
         </p:txBody>
       </p:sp>
@@ -2292,38 +2235,37 @@
           <a:p>
             <a:pPr lvl="0"/>
             <a:r>
-              <a:rPr lang="en-US" smtClean="0"/>
+              <a:rPr lang="en-US"/>
               <a:t>Click to edit Master text styles</a:t>
             </a:r>
           </a:p>
           <a:p>
             <a:pPr lvl="1"/>
             <a:r>
-              <a:rPr lang="en-US" smtClean="0"/>
+              <a:rPr lang="en-US"/>
               <a:t>Second level</a:t>
             </a:r>
           </a:p>
           <a:p>
             <a:pPr lvl="2"/>
             <a:r>
-              <a:rPr lang="en-US" smtClean="0"/>
+              <a:rPr lang="en-US"/>
               <a:t>Third level</a:t>
             </a:r>
           </a:p>
           <a:p>
             <a:pPr lvl="3"/>
             <a:r>
-              <a:rPr lang="en-US" smtClean="0"/>
+              <a:rPr lang="en-US"/>
               <a:t>Fourth level</a:t>
             </a:r>
           </a:p>
           <a:p>
             <a:pPr lvl="4"/>
             <a:r>
-              <a:rPr lang="en-US" smtClean="0"/>
+              <a:rPr lang="en-US"/>
               <a:t>Fifth level</a:t>
             </a:r>
-            <a:endParaRPr lang="en-US"/>
           </a:p>
         </p:txBody>
       </p:sp>
@@ -2386,7 +2328,7 @@
           <a:p>
             <a:pPr lvl="0"/>
             <a:r>
-              <a:rPr lang="en-US" smtClean="0"/>
+              <a:rPr lang="en-US"/>
               <a:t>Click to edit Master text styles</a:t>
             </a:r>
           </a:p>
@@ -2512,10 +2454,9 @@
           </a:lstStyle>
           <a:p>
             <a:r>
-              <a:rPr lang="en-US" smtClean="0"/>
+              <a:rPr lang="en-US"/>
               <a:t>Click to edit Master title style</a:t>
             </a:r>
-            <a:endParaRPr lang="en-US"/>
           </a:p>
         </p:txBody>
       </p:sp>
@@ -2639,7 +2580,7 @@
           <a:p>
             <a:pPr lvl="0"/>
             <a:r>
-              <a:rPr lang="en-US" smtClean="0"/>
+              <a:rPr lang="en-US"/>
               <a:t>Click to edit Master text styles</a:t>
             </a:r>
           </a:p>
@@ -2776,10 +2717,9 @@
           <a:lstStyle/>
           <a:p>
             <a:r>
-              <a:rPr lang="en-US" smtClean="0"/>
+              <a:rPr lang="en-US"/>
               <a:t>Click to edit Master title style</a:t>
             </a:r>
-            <a:endParaRPr lang="en-US"/>
           </a:p>
         </p:txBody>
       </p:sp>
@@ -2810,38 +2750,37 @@
           <a:p>
             <a:pPr lvl="0"/>
             <a:r>
-              <a:rPr lang="en-US" smtClean="0"/>
+              <a:rPr lang="en-US"/>
               <a:t>Click to edit Master text styles</a:t>
             </a:r>
           </a:p>
           <a:p>
             <a:pPr lvl="1"/>
             <a:r>
-              <a:rPr lang="en-US" smtClean="0"/>
+              <a:rPr lang="en-US"/>
               <a:t>Second level</a:t>
             </a:r>
           </a:p>
           <a:p>
             <a:pPr lvl="2"/>
             <a:r>
-              <a:rPr lang="en-US" smtClean="0"/>
+              <a:rPr lang="en-US"/>
               <a:t>Third level</a:t>
             </a:r>
           </a:p>
           <a:p>
             <a:pPr lvl="3"/>
             <a:r>
-              <a:rPr lang="en-US" smtClean="0"/>
+              <a:rPr lang="en-US"/>
               <a:t>Fourth level</a:t>
             </a:r>
           </a:p>
           <a:p>
             <a:pPr lvl="4"/>
             <a:r>
-              <a:rPr lang="en-US" smtClean="0"/>
+              <a:rPr lang="en-US"/>
               <a:t>Fifth level</a:t>
             </a:r>
-            <a:endParaRPr lang="en-US"/>
           </a:p>
         </p:txBody>
       </p:sp>
@@ -2985,13 +2924,6 @@
     <p:sldLayoutId id="2147483658" r:id="rId10"/>
     <p:sldLayoutId id="2147483659" r:id="rId11"/>
   </p:sldLayoutIdLst>
-  <p:timing>
-    <p:tnLst>
-      <p:par>
-        <p:cTn id="1" dur="indefinite" restart="never" nodeType="tmRoot"/>
-      </p:par>
-    </p:tnLst>
-  </p:timing>
   <p:txStyles>
     <p:titleStyle>
       <a:lvl1pPr algn="ctr" defTabSz="914400" rtl="0" eaLnBrk="1" latinLnBrk="0" hangingPunct="1">
@@ -3486,7 +3418,7 @@
               <a:defRPr/>
             </a:pPr>
             <a:r>
-              <a:rPr kumimoji="0" lang="en-US" sz="2400" b="1" i="0" u="none" strike="noStrike" kern="1200" cap="none" spc="0" normalizeH="0" baseline="0" noProof="0" dirty="0" smtClean="0">
+              <a:rPr kumimoji="0" lang="en-US" sz="2400" b="1" i="0" u="none" strike="noStrike" kern="1200" cap="none" spc="0" normalizeH="0" baseline="0" noProof="0" dirty="0">
                 <a:ln>
                   <a:noFill/>
                 </a:ln>
@@ -3504,7 +3436,7 @@
               <a:t>MIST7590 – MIT Project</a:t>
             </a:r>
             <a:r>
-              <a:rPr kumimoji="0" lang="en-US" sz="2400" b="1" i="0" u="none" strike="noStrike" kern="1200" cap="none" spc="0" normalizeH="0" noProof="0" dirty="0" smtClean="0">
+              <a:rPr kumimoji="0" lang="en-US" sz="2400" b="1" i="0" u="none" strike="noStrike" kern="1200" cap="none" spc="0" normalizeH="0" noProof="0" dirty="0">
                 <a:ln>
                   <a:noFill/>
                 </a:ln>
@@ -3521,7 +3453,7 @@
               </a:rPr>
               <a:t> I</a:t>
             </a:r>
-            <a:endParaRPr kumimoji="0" lang="en-US" sz="2400" b="1" i="0" u="none" strike="noStrike" kern="1200" cap="none" spc="0" normalizeH="0" baseline="0" noProof="0" dirty="0" smtClean="0">
+            <a:endParaRPr kumimoji="0" lang="en-US" sz="2400" b="1" i="0" u="none" strike="noStrike" kern="1200" cap="none" spc="0" normalizeH="0" baseline="0" noProof="0" dirty="0">
               <a:ln>
                 <a:noFill/>
               </a:ln>
@@ -3558,7 +3490,7 @@
               <a:defRPr/>
             </a:pPr>
             <a:r>
-              <a:rPr kumimoji="0" lang="en-US" sz="2400" b="1" i="0" u="none" strike="noStrike" kern="1200" cap="none" spc="0" normalizeH="0" baseline="0" noProof="0" dirty="0" smtClean="0">
+              <a:rPr kumimoji="0" lang="en-US" sz="2400" b="1" i="0" u="none" strike="noStrike" kern="1200" cap="none" spc="0" normalizeH="0" baseline="0" noProof="0" dirty="0">
                 <a:ln>
                   <a:noFill/>
                 </a:ln>
@@ -3597,7 +3529,7 @@
               <a:defRPr/>
             </a:pPr>
             <a:r>
-              <a:rPr lang="en-US" b="1" dirty="0" smtClean="0">
+              <a:rPr lang="en-US" b="1" dirty="0">
                 <a:solidFill>
                   <a:schemeClr val="tx1">
                     <a:lumMod val="75000"/>
@@ -3630,7 +3562,7 @@
               <a:defRPr/>
             </a:pPr>
             <a:r>
-              <a:rPr kumimoji="0" lang="en-US" sz="2400" b="1" i="0" u="none" strike="noStrike" kern="1200" cap="none" spc="0" normalizeH="0" baseline="0" noProof="0" dirty="0" smtClean="0">
+              <a:rPr kumimoji="0" lang="en-US" sz="2400" b="1" i="0" u="none" strike="noStrike" kern="1200" cap="none" spc="0" normalizeH="0" baseline="0" noProof="0" dirty="0">
                 <a:ln>
                   <a:noFill/>
                 </a:ln>
@@ -3669,7 +3601,7 @@
               <a:defRPr/>
             </a:pPr>
             <a:r>
-              <a:rPr kumimoji="0" lang="en-US" sz="2400" b="1" i="0" u="none" strike="noStrike" kern="1200" cap="none" spc="0" normalizeH="0" baseline="0" noProof="0" dirty="0" smtClean="0">
+              <a:rPr kumimoji="0" lang="en-US" sz="2400" b="1" i="0" u="none" strike="noStrike" kern="1200" cap="none" spc="0" normalizeH="0" baseline="0" noProof="0" dirty="0">
                 <a:ln>
                   <a:noFill/>
                 </a:ln>
@@ -3708,7 +3640,7 @@
               <a:defRPr/>
             </a:pPr>
             <a:r>
-              <a:rPr kumimoji="0" lang="en-US" sz="2400" b="1" i="0" u="none" strike="noStrike" kern="1200" cap="none" spc="0" normalizeH="0" baseline="0" noProof="0" dirty="0" smtClean="0">
+              <a:rPr kumimoji="0" lang="en-US" sz="2400" b="1" i="0" u="none" strike="noStrike" kern="1200" cap="none" spc="0" normalizeH="0" baseline="0" noProof="0" dirty="0">
                 <a:ln>
                   <a:noFill/>
                 </a:ln>
@@ -3746,7 +3678,7 @@
               <a:tabLst/>
               <a:defRPr/>
             </a:pPr>
-            <a:endParaRPr kumimoji="0" lang="en-US" sz="2400" b="1" i="0" u="none" strike="noStrike" kern="1200" cap="none" spc="0" normalizeH="0" baseline="0" noProof="0" dirty="0" smtClean="0">
+            <a:endParaRPr kumimoji="0" lang="en-US" sz="2400" b="1" i="0" u="none" strike="noStrike" kern="1200" cap="none" spc="0" normalizeH="0" baseline="0" noProof="0" dirty="0">
               <a:ln>
                 <a:noFill/>
               </a:ln>
@@ -3783,7 +3715,7 @@
               <a:defRPr/>
             </a:pPr>
             <a:r>
-              <a:rPr lang="en-US" b="1" noProof="0" dirty="0" smtClean="0">
+              <a:rPr lang="en-US" b="1" noProof="0" dirty="0">
                 <a:solidFill>
                   <a:schemeClr val="tx1">
                     <a:lumMod val="75000"/>
@@ -3795,7 +3727,7 @@
               <a:t>September 20</a:t>
             </a:r>
             <a:r>
-              <a:rPr kumimoji="0" lang="en-US" sz="2400" b="1" i="0" u="none" strike="noStrike" kern="1200" cap="none" spc="0" normalizeH="0" baseline="0" noProof="0" dirty="0" smtClean="0">
+              <a:rPr kumimoji="0" lang="en-US" sz="2400" b="1" i="0" u="none" strike="noStrike" kern="1200" cap="none" spc="0" normalizeH="0" baseline="0" noProof="0" dirty="0">
                 <a:ln>
                   <a:noFill/>
                 </a:ln>
@@ -3812,21 +3744,6 @@
               </a:rPr>
               <a:t>, 2017</a:t>
             </a:r>
-            <a:endParaRPr kumimoji="0" lang="en-US" sz="2400" b="1" i="0" u="none" strike="noStrike" kern="1200" cap="none" spc="0" normalizeH="0" baseline="0" noProof="0" dirty="0">
-              <a:ln>
-                <a:noFill/>
-              </a:ln>
-              <a:solidFill>
-                <a:schemeClr val="tx1">
-                  <a:lumMod val="75000"/>
-                  <a:lumOff val="25000"/>
-                </a:schemeClr>
-              </a:solidFill>
-              <a:effectLst/>
-              <a:uLnTx/>
-              <a:uFillTx/>
-              <a:latin typeface="Calibri" panose="020F0502020204030204" pitchFamily="34" charset="0"/>
-            </a:endParaRPr>
           </a:p>
         </p:txBody>
       </p:sp>
@@ -3890,7 +3807,7 @@
               <a:defRPr/>
             </a:pPr>
             <a:r>
-              <a:rPr kumimoji="0" lang="en-US" sz="4400" b="1" i="0" u="none" strike="noStrike" kern="1200" cap="none" spc="0" normalizeH="0" baseline="0" noProof="0" dirty="0" smtClean="0">
+              <a:rPr kumimoji="0" lang="en-US" sz="4400" b="1" i="0" u="none" strike="noStrike" kern="1200" cap="none" spc="0" normalizeH="0" baseline="0" noProof="0" dirty="0">
                 <a:ln w="6350">
                   <a:noFill/>
                 </a:ln>
@@ -3924,7 +3841,7 @@
               <a:defRPr/>
             </a:pPr>
             <a:r>
-              <a:rPr lang="en-US" b="1" dirty="0" smtClean="0">
+              <a:rPr lang="en-US" b="1" dirty="0">
                 <a:solidFill>
                   <a:schemeClr val="tx1"/>
                 </a:solidFill>
@@ -3998,13 +3915,6 @@
   <p:clrMapOvr>
     <a:masterClrMapping/>
   </p:clrMapOvr>
-  <p:timing>
-    <p:tnLst>
-      <p:par>
-        <p:cTn id="1" dur="indefinite" restart="never" nodeType="tmRoot"/>
-      </p:par>
-    </p:tnLst>
-  </p:timing>
 </p:sld>
 </file>
 
@@ -4061,7 +3971,7 @@
               <a:defRPr/>
             </a:pPr>
             <a:r>
-              <a:rPr kumimoji="0" lang="en-US" sz="3600" b="1" i="0" u="none" strike="noStrike" kern="1200" cap="none" spc="0" normalizeH="0" baseline="0" noProof="0" dirty="0" smtClean="0">
+              <a:rPr kumimoji="0" lang="en-US" sz="3600" b="1" i="0" u="none" strike="noStrike" kern="1200" cap="none" spc="0" normalizeH="0" baseline="0" noProof="0" dirty="0">
                 <a:ln>
                   <a:noFill/>
                 </a:ln>
@@ -4124,13 +4034,6 @@
   <p:clrMapOvr>
     <a:masterClrMapping/>
   </p:clrMapOvr>
-  <p:timing>
-    <p:tnLst>
-      <p:par>
-        <p:cTn id="1" dur="indefinite" restart="never" nodeType="tmRoot"/>
-      </p:par>
-    </p:tnLst>
-  </p:timing>
 </p:sld>
 </file>
 
@@ -4195,10 +4098,9 @@
               </a:spcBef>
             </a:pPr>
             <a:r>
-              <a:rPr lang="en-US" sz="4800" b="1" dirty="0" smtClean="0"/>
+              <a:rPr lang="en-US" sz="4800" b="1" dirty="0"/>
               <a:t>Successes</a:t>
             </a:r>
-            <a:endParaRPr lang="en-US" sz="4800" b="1" dirty="0"/>
           </a:p>
         </p:txBody>
       </p:sp>
@@ -4232,7 +4134,7 @@
               <a:buChar char="•"/>
             </a:pPr>
             <a:r>
-              <a:rPr lang="en-US" sz="3600" dirty="0" smtClean="0"/>
+              <a:rPr lang="en-US" sz="3600" dirty="0"/>
               <a:t>Found malicious injected code</a:t>
             </a:r>
           </a:p>
@@ -4245,7 +4147,7 @@
               <a:buChar char="•"/>
             </a:pPr>
             <a:r>
-              <a:rPr lang="en-US" sz="3600" dirty="0" smtClean="0"/>
+              <a:rPr lang="en-US" sz="3600" dirty="0"/>
               <a:t>Prevented the injected code from being displayed temporarily</a:t>
             </a:r>
           </a:p>
@@ -4258,10 +4160,9 @@
               <a:buChar char="•"/>
             </a:pPr>
             <a:r>
-              <a:rPr lang="en-US" sz="3600" dirty="0" smtClean="0"/>
+              <a:rPr lang="en-US" sz="3600" dirty="0"/>
               <a:t>Developed recommended solutions</a:t>
             </a:r>
-            <a:endParaRPr lang="en-US" sz="3600" dirty="0"/>
           </a:p>
         </p:txBody>
       </p:sp>
@@ -4275,13 +4176,6 @@
   <p:clrMapOvr>
     <a:masterClrMapping/>
   </p:clrMapOvr>
-  <p:timing>
-    <p:tnLst>
-      <p:par>
-        <p:cTn id="1" dur="indefinite" restart="never" nodeType="tmRoot"/>
-      </p:par>
-    </p:tnLst>
-  </p:timing>
 </p:sld>
 </file>
 
@@ -4346,10 +4240,9 @@
               </a:spcBef>
             </a:pPr>
             <a:r>
-              <a:rPr lang="en-US" sz="4800" b="1" dirty="0" smtClean="0"/>
+              <a:rPr lang="en-US" sz="4800" b="1" dirty="0"/>
               <a:t>Challenges</a:t>
             </a:r>
-            <a:endParaRPr lang="en-US" sz="4800" b="1" dirty="0"/>
           </a:p>
         </p:txBody>
       </p:sp>
@@ -4383,7 +4276,7 @@
               <a:buChar char="•"/>
             </a:pPr>
             <a:r>
-              <a:rPr lang="en-US" sz="3600" dirty="0" smtClean="0"/>
+              <a:rPr lang="en-US" sz="3600" dirty="0"/>
               <a:t>Limited knowledge of using WordPress and PHP</a:t>
             </a:r>
           </a:p>
@@ -4396,7 +4289,7 @@
               <a:buChar char="−"/>
             </a:pPr>
             <a:r>
-              <a:rPr lang="en-US" sz="3200" dirty="0" smtClean="0"/>
+              <a:rPr lang="en-US" sz="3200" dirty="0"/>
               <a:t>One team member has some experience using these tools</a:t>
             </a:r>
           </a:p>
@@ -4409,18 +4302,13 @@
               <a:buChar char="•"/>
             </a:pPr>
             <a:r>
-              <a:rPr lang="en-US" sz="3600" dirty="0" smtClean="0">
+              <a:rPr lang="en-US" sz="3600" dirty="0">
                 <a:solidFill>
                   <a:prstClr val="black"/>
                 </a:solidFill>
               </a:rPr>
               <a:t>Difficulty in finding any remaining malicious injected codes</a:t>
             </a:r>
-            <a:endParaRPr lang="en-US" sz="3600" dirty="0">
-              <a:solidFill>
-                <a:prstClr val="black"/>
-              </a:solidFill>
-            </a:endParaRPr>
           </a:p>
           <a:p>
             <a:pPr marL="914400" lvl="1" indent="-457200">
@@ -4444,13 +4332,6 @@
   <p:clrMapOvr>
     <a:masterClrMapping/>
   </p:clrMapOvr>
-  <p:timing>
-    <p:tnLst>
-      <p:par>
-        <p:cTn id="1" dur="indefinite" restart="never" nodeType="tmRoot"/>
-      </p:par>
-    </p:tnLst>
-  </p:timing>
 </p:sld>
 </file>
 
@@ -4515,10 +4396,9 @@
               </a:spcBef>
             </a:pPr>
             <a:r>
-              <a:rPr lang="en-US" sz="4800" b="1" dirty="0" smtClean="0"/>
+              <a:rPr lang="en-US" sz="4800" b="1" dirty="0"/>
               <a:t>Way Ahead</a:t>
             </a:r>
-            <a:endParaRPr lang="en-US" sz="4800" b="1" dirty="0"/>
           </a:p>
         </p:txBody>
       </p:sp>
@@ -4552,7 +4432,7 @@
               <a:buChar char="•"/>
             </a:pPr>
             <a:r>
-              <a:rPr lang="en-US" sz="3600" dirty="0" smtClean="0"/>
+              <a:rPr lang="en-US" sz="3600" dirty="0"/>
               <a:t>Prioritize user requirements from high to low &amp; define system requirements by Sep 24th</a:t>
             </a:r>
           </a:p>
@@ -4565,14 +4445,14 @@
               <a:buChar char="•"/>
             </a:pPr>
             <a:r>
-              <a:rPr lang="en-US" sz="3600" dirty="0" smtClean="0"/>
+              <a:rPr lang="en-US" sz="3600" dirty="0"/>
               <a:t>Update WBS/Project Plan by Sep 30</a:t>
             </a:r>
             <a:r>
-              <a:rPr lang="en-US" sz="3600" baseline="30000" dirty="0" smtClean="0"/>
+              <a:rPr lang="en-US" sz="3600" baseline="30000" dirty="0"/>
               <a:t>th</a:t>
             </a:r>
-            <a:endParaRPr lang="en-US" sz="3600" dirty="0" smtClean="0"/>
+            <a:endParaRPr lang="en-US" sz="3600" dirty="0"/>
           </a:p>
           <a:p>
             <a:pPr marL="914400" lvl="1" indent="-457200">
@@ -4584,11 +4464,7 @@
             </a:pPr>
             <a:r>
               <a:rPr lang="en-US" sz="3200" dirty="0"/>
-              <a:t>P</a:t>
-            </a:r>
-            <a:r>
-              <a:rPr lang="en-US" sz="3200" dirty="0" smtClean="0"/>
-              <a:t>lan for Incremental Approach</a:t>
+              <a:t>Plan for Incremental Approach</a:t>
             </a:r>
           </a:p>
           <a:p>
@@ -4600,7 +4476,7 @@
               <a:buChar char="•"/>
             </a:pPr>
             <a:r>
-              <a:rPr lang="en-US" sz="3600" dirty="0" smtClean="0"/>
+              <a:rPr lang="en-US" sz="3600" dirty="0"/>
               <a:t>Build simple prototype of the website</a:t>
             </a:r>
           </a:p>
@@ -4613,7 +4489,7 @@
               <a:buChar char="•"/>
             </a:pPr>
             <a:r>
-              <a:rPr lang="en-US" sz="3600" dirty="0" smtClean="0"/>
+              <a:rPr lang="en-US" sz="3600" dirty="0"/>
               <a:t>Meet with stakeholders</a:t>
             </a:r>
           </a:p>
@@ -4629,13 +4505,6 @@
   <p:clrMapOvr>
     <a:masterClrMapping/>
   </p:clrMapOvr>
-  <p:timing>
-    <p:tnLst>
-      <p:par>
-        <p:cTn id="1" dur="indefinite" restart="never" nodeType="tmRoot"/>
-      </p:par>
-    </p:tnLst>
-  </p:timing>
 </p:sld>
 </file>
 
@@ -4695,10 +4564,9 @@
           </a:lstStyle>
           <a:p>
             <a:r>
-              <a:rPr lang="en-US" sz="6000" b="1" dirty="0" smtClean="0"/>
+              <a:rPr lang="en-US" sz="6000" b="1" dirty="0"/>
               <a:t>BACKUPS</a:t>
             </a:r>
-            <a:endParaRPr lang="en-US" sz="6000" b="1" dirty="0"/>
           </a:p>
         </p:txBody>
       </p:sp>
@@ -4712,13 +4580,6 @@
   <p:clrMapOvr>
     <a:masterClrMapping/>
   </p:clrMapOvr>
-  <p:timing>
-    <p:tnLst>
-      <p:par>
-        <p:cTn id="1" dur="indefinite" restart="never" nodeType="tmRoot"/>
-      </p:par>
-    </p:tnLst>
-  </p:timing>
 </p:sld>
 </file>
 
@@ -4778,10 +4639,9 @@
           </a:lstStyle>
           <a:p>
             <a:r>
-              <a:rPr lang="en-US" b="1" dirty="0" smtClean="0"/>
+              <a:rPr lang="en-US" b="1" dirty="0"/>
               <a:t>Dr. Huber’s Recommendation</a:t>
             </a:r>
-            <a:endParaRPr lang="en-US" b="1" dirty="0"/>
           </a:p>
         </p:txBody>
       </p:sp>
@@ -4812,12 +4672,8 @@
               <a:buChar char="•"/>
             </a:pPr>
             <a:r>
-              <a:rPr lang="en-US" sz="2800" dirty="0" smtClean="0"/>
-              <a:t>This </a:t>
-            </a:r>
-            <a:r>
               <a:rPr lang="en-US" sz="2800" dirty="0"/>
-              <a:t>project will be more of a </a:t>
+              <a:t>This project will be more of a </a:t>
             </a:r>
             <a:r>
               <a:rPr lang="en-US" sz="2800" b="1" dirty="0">
@@ -4838,16 +4694,8 @@
               <a:buChar char="•"/>
             </a:pPr>
             <a:r>
-              <a:rPr lang="en-US" sz="2800" dirty="0" smtClean="0"/>
-              <a:t>However</a:t>
-            </a:r>
-            <a:r>
               <a:rPr lang="en-US" sz="2800" dirty="0"/>
-              <a:t>, the analysis and your team’s recommendations will also be a major deliverable for </a:t>
-            </a:r>
-            <a:r>
-              <a:rPr lang="en-US" sz="2800" dirty="0" smtClean="0"/>
-              <a:t>Fall</a:t>
+              <a:t>However, the analysis and your team’s recommendations will also be a major deliverable for Fall</a:t>
             </a:r>
           </a:p>
           <a:p>
@@ -4855,29 +4703,13 @@
               <a:buFont typeface="Arial" panose="020B0604020202020204" pitchFamily="34" charset="0"/>
               <a:buChar char="•"/>
             </a:pPr>
-            <a:r>
-              <a:rPr lang="en-US" sz="2800" b="1" dirty="0" smtClean="0">
-                <a:solidFill>
-                  <a:srgbClr val="FF0000"/>
-                </a:solidFill>
-              </a:rPr>
-              <a:t>Look </a:t>
-            </a:r>
             <a:r>
               <a:rPr lang="en-US" sz="2800" b="1" dirty="0">
                 <a:solidFill>
                   <a:srgbClr val="FF0000"/>
                 </a:solidFill>
               </a:rPr>
-              <a:t>at the existing website and extract what you think are the initial requirements of the Friends </a:t>
-            </a:r>
-            <a:r>
-              <a:rPr lang="en-US" sz="2800" b="1" dirty="0" smtClean="0">
-                <a:solidFill>
-                  <a:srgbClr val="FF0000"/>
-                </a:solidFill>
-              </a:rPr>
-              <a:t>Chapter</a:t>
+              <a:t>Look at the existing website and extract what you think are the initial requirements of the Friends Chapter</a:t>
             </a:r>
           </a:p>
           <a:p>
@@ -4886,16 +4718,8 @@
               <a:buChar char="•"/>
             </a:pPr>
             <a:r>
-              <a:rPr lang="en-US" sz="2800" dirty="0" smtClean="0"/>
-              <a:t>This </a:t>
-            </a:r>
-            <a:r>
               <a:rPr lang="en-US" sz="2800" dirty="0"/>
-              <a:t>will also give you an idea of the feature set and </a:t>
-            </a:r>
-            <a:r>
-              <a:rPr lang="en-US" sz="2800" dirty="0" smtClean="0"/>
-              <a:t>UI/UX</a:t>
+              <a:t>This will also give you an idea of the feature set and UI/UX</a:t>
             </a:r>
           </a:p>
           <a:p>
@@ -4904,12 +4728,8 @@
               <a:buChar char="•"/>
             </a:pPr>
             <a:r>
-              <a:rPr lang="en-US" sz="2800" dirty="0" smtClean="0"/>
-              <a:t>Biggest </a:t>
-            </a:r>
-            <a:r>
               <a:rPr lang="en-US" sz="2800" dirty="0"/>
-              <a:t>complaints about the website were </a:t>
+              <a:t>Biggest complaints about the website were </a:t>
             </a:r>
             <a:r>
               <a:rPr lang="en-US" sz="2800" b="1" dirty="0">
@@ -4917,15 +4737,7 @@
                   <a:srgbClr val="FF0000"/>
                 </a:solidFill>
               </a:rPr>
-              <a:t>ease of update/maintenance, and </a:t>
-            </a:r>
-            <a:r>
-              <a:rPr lang="en-US" sz="2800" b="1" dirty="0" smtClean="0">
-                <a:solidFill>
-                  <a:srgbClr val="FF0000"/>
-                </a:solidFill>
-              </a:rPr>
-              <a:t>security</a:t>
+              <a:t>ease of update/maintenance, and security</a:t>
             </a:r>
           </a:p>
           <a:p>
@@ -4934,12 +4746,8 @@
               <a:buChar char="•"/>
             </a:pPr>
             <a:r>
-              <a:rPr lang="en-US" sz="2800" dirty="0" smtClean="0"/>
-              <a:t>Use </a:t>
-            </a:r>
-            <a:r>
               <a:rPr lang="en-US" sz="2800" dirty="0"/>
-              <a:t>the feature set you discover to create a starting point for the conversation with the sponsor.</a:t>
+              <a:t>Use the feature set you discover to create a starting point for the conversation with the sponsor.</a:t>
             </a:r>
           </a:p>
         </p:txBody>
@@ -4954,13 +4762,6 @@
   <p:clrMapOvr>
     <a:masterClrMapping/>
   </p:clrMapOvr>
-  <p:timing>
-    <p:tnLst>
-      <p:par>
-        <p:cTn id="1" dur="indefinite" restart="never" nodeType="tmRoot"/>
-      </p:par>
-    </p:tnLst>
-  </p:timing>
 </p:sld>
 </file>
 
@@ -5025,10 +4826,9 @@
               </a:spcBef>
             </a:pPr>
             <a:r>
-              <a:rPr lang="en-US" sz="4800" b="1" dirty="0" smtClean="0"/>
+              <a:rPr lang="en-US" sz="4800" b="1" dirty="0"/>
               <a:t>Existing Login Accounts</a:t>
             </a:r>
-            <a:endParaRPr lang="en-US" sz="4800" b="1" dirty="0"/>
           </a:p>
         </p:txBody>
       </p:sp>
@@ -5276,13 +5076,6 @@
   <p:clrMapOvr>
     <a:masterClrMapping/>
   </p:clrMapOvr>
-  <p:timing>
-    <p:tnLst>
-      <p:par>
-        <p:cTn id="1" dur="indefinite" restart="never" nodeType="tmRoot"/>
-      </p:par>
-    </p:tnLst>
-  </p:timing>
 </p:sld>
 </file>
 
@@ -5347,12 +5140,8 @@
               </a:spcBef>
             </a:pPr>
             <a:r>
-              <a:rPr lang="en-US" sz="4800" b="1" dirty="0" smtClean="0"/>
-              <a:t>Development </a:t>
-            </a:r>
-            <a:r>
               <a:rPr lang="en-US" sz="4800" b="1" dirty="0"/>
-              <a:t>Approach</a:t>
+              <a:t>Development Approach</a:t>
             </a:r>
           </a:p>
         </p:txBody>
@@ -5387,7 +5176,7 @@
               <a:buChar char="•"/>
             </a:pPr>
             <a:r>
-              <a:rPr lang="en-US" sz="3600" dirty="0" smtClean="0"/>
+              <a:rPr lang="en-US" sz="3600" dirty="0"/>
               <a:t>Use Incremental Approach</a:t>
             </a:r>
           </a:p>
@@ -5400,7 +5189,7 @@
               <a:buChar char="•"/>
             </a:pPr>
             <a:r>
-              <a:rPr lang="en-US" sz="3600" dirty="0" smtClean="0"/>
+              <a:rPr lang="en-US" sz="3600" dirty="0"/>
               <a:t>Learn using WordPress &amp; PHP</a:t>
             </a:r>
           </a:p>
@@ -5413,7 +5202,7 @@
               <a:buChar char="•"/>
             </a:pPr>
             <a:r>
-              <a:rPr lang="en-US" sz="3600" dirty="0" smtClean="0"/>
+              <a:rPr lang="en-US" sz="3600" dirty="0"/>
               <a:t>Use single type IDE/Code Editor (Eclipse)</a:t>
             </a:r>
           </a:p>
@@ -5426,7 +5215,7 @@
               <a:buChar char="•"/>
             </a:pPr>
             <a:r>
-              <a:rPr lang="en-US" sz="3600" dirty="0" smtClean="0"/>
+              <a:rPr lang="en-US" sz="3600" dirty="0"/>
               <a:t>Use Java and JavaScript Libraries</a:t>
             </a:r>
           </a:p>
@@ -5439,7 +5228,7 @@
               <a:buChar char="−"/>
             </a:pPr>
             <a:r>
-              <a:rPr lang="en-US" sz="3200" dirty="0" smtClean="0"/>
+              <a:rPr lang="en-US" sz="3200" dirty="0"/>
               <a:t>Simplify rebuild of the website</a:t>
             </a:r>
           </a:p>
@@ -5452,7 +5241,7 @@
               <a:buChar char="−"/>
             </a:pPr>
             <a:r>
-              <a:rPr lang="en-US" sz="3200" dirty="0" smtClean="0"/>
+              <a:rPr lang="en-US" sz="3200" dirty="0"/>
               <a:t>Avoid reinventing the wheel</a:t>
             </a:r>
           </a:p>
@@ -5465,10 +5254,9 @@
               <a:buChar char="•"/>
             </a:pPr>
             <a:r>
-              <a:rPr lang="en-US" sz="3600" dirty="0" smtClean="0"/>
+              <a:rPr lang="en-US" sz="3600" dirty="0"/>
               <a:t>Build a simple prototype of the website</a:t>
             </a:r>
-            <a:endParaRPr lang="en-US" sz="3600" dirty="0"/>
           </a:p>
         </p:txBody>
       </p:sp>
@@ -5482,13 +5270,6 @@
   <p:clrMapOvr>
     <a:masterClrMapping/>
   </p:clrMapOvr>
-  <p:timing>
-    <p:tnLst>
-      <p:par>
-        <p:cTn id="1" dur="indefinite" restart="never" nodeType="tmRoot"/>
-      </p:par>
-    </p:tnLst>
-  </p:timing>
 </p:sld>
 </file>
 
@@ -5586,11 +5367,11 @@
               <a:buChar char="•"/>
             </a:pPr>
             <a:r>
-              <a:rPr lang="en-US" sz="3200" dirty="0" smtClean="0"/>
+              <a:rPr lang="en-US" sz="3200" dirty="0"/>
               <a:t>Update Project Plan by </a:t>
             </a:r>
             <a:r>
-              <a:rPr lang="en-US" sz="3200" b="1" dirty="0" smtClean="0">
+              <a:rPr lang="en-US" sz="3200" b="1" dirty="0">
                 <a:solidFill>
                   <a:srgbClr val="FF0000"/>
                 </a:solidFill>
@@ -5598,7 +5379,7 @@
               <a:t>Sep 30</a:t>
             </a:r>
             <a:r>
-              <a:rPr lang="en-US" sz="3200" b="1" baseline="30000" dirty="0" smtClean="0">
+              <a:rPr lang="en-US" sz="3200" b="1" baseline="30000" dirty="0">
                 <a:solidFill>
                   <a:srgbClr val="FF0000"/>
                 </a:solidFill>
@@ -5673,13 +5454,6 @@
   <p:clrMapOvr>
     <a:masterClrMapping/>
   </p:clrMapOvr>
-  <p:timing>
-    <p:tnLst>
-      <p:par>
-        <p:cTn id="1" dur="indefinite" restart="never" nodeType="tmRoot"/>
-      </p:par>
-    </p:tnLst>
-  </p:timing>
 </p:sld>
 </file>
 
@@ -5739,10 +5513,9 @@
           </a:lstStyle>
           <a:p>
             <a:r>
-              <a:rPr lang="en-US" b="1" dirty="0" smtClean="0"/>
+              <a:rPr lang="en-US" b="1" dirty="0"/>
               <a:t>Overview</a:t>
             </a:r>
-            <a:endParaRPr lang="en-US" b="1" dirty="0"/>
           </a:p>
         </p:txBody>
       </p:sp>
@@ -5776,7 +5549,7 @@
               <a:buChar char="•"/>
             </a:pPr>
             <a:r>
-              <a:rPr lang="en-US" sz="3600" dirty="0" smtClean="0"/>
+              <a:rPr lang="en-US" sz="3600" dirty="0"/>
               <a:t>Team Member Roles</a:t>
             </a:r>
           </a:p>
@@ -5789,7 +5562,7 @@
               <a:buChar char="•"/>
             </a:pPr>
             <a:r>
-              <a:rPr lang="en-US" sz="3600" dirty="0" smtClean="0"/>
+              <a:rPr lang="en-US" sz="3600" dirty="0"/>
               <a:t>Investigation of the Website</a:t>
             </a:r>
           </a:p>
@@ -5802,7 +5575,7 @@
               <a:buChar char="•"/>
             </a:pPr>
             <a:r>
-              <a:rPr lang="en-US" sz="3600" dirty="0" smtClean="0"/>
+              <a:rPr lang="en-US" sz="3600" dirty="0"/>
               <a:t>Proposed Solutions to Security Vulnerability</a:t>
             </a:r>
           </a:p>
@@ -5815,7 +5588,7 @@
               <a:buChar char="•"/>
             </a:pPr>
             <a:r>
-              <a:rPr lang="en-US" sz="3600" dirty="0" smtClean="0"/>
+              <a:rPr lang="en-US" sz="3600" dirty="0"/>
               <a:t>Suggested User Requirements</a:t>
             </a:r>
           </a:p>
@@ -5828,7 +5601,7 @@
               <a:buChar char="•"/>
             </a:pPr>
             <a:r>
-              <a:rPr lang="en-US" sz="3600" dirty="0" smtClean="0"/>
+              <a:rPr lang="en-US" sz="3600" dirty="0"/>
               <a:t>Home Page Mockups</a:t>
             </a:r>
           </a:p>
@@ -5841,7 +5614,7 @@
               <a:buChar char="•"/>
             </a:pPr>
             <a:r>
-              <a:rPr lang="en-US" sz="3600" dirty="0" smtClean="0"/>
+              <a:rPr lang="en-US" sz="3600" dirty="0"/>
               <a:t>Successes</a:t>
             </a:r>
           </a:p>
@@ -5854,7 +5627,7 @@
               <a:buChar char="•"/>
             </a:pPr>
             <a:r>
-              <a:rPr lang="en-US" sz="3600" dirty="0" smtClean="0"/>
+              <a:rPr lang="en-US" sz="3600" dirty="0"/>
               <a:t>Challenges</a:t>
             </a:r>
           </a:p>
@@ -5867,7 +5640,7 @@
               <a:buChar char="•"/>
             </a:pPr>
             <a:r>
-              <a:rPr lang="en-US" sz="3600" dirty="0" smtClean="0"/>
+              <a:rPr lang="en-US" sz="3600" dirty="0"/>
               <a:t>Way Ahead</a:t>
             </a:r>
           </a:p>
@@ -5883,13 +5656,6 @@
   <p:clrMapOvr>
     <a:masterClrMapping/>
   </p:clrMapOvr>
-  <p:timing>
-    <p:tnLst>
-      <p:par>
-        <p:cTn id="1" dur="indefinite" restart="never" nodeType="tmRoot"/>
-      </p:par>
-    </p:tnLst>
-  </p:timing>
 </p:sld>
 </file>
 
@@ -5949,10 +5715,9 @@
           </a:lstStyle>
           <a:p>
             <a:r>
-              <a:rPr lang="en-US" b="1" dirty="0" smtClean="0"/>
+              <a:rPr lang="en-US" b="1" dirty="0"/>
               <a:t>Team Member Roles</a:t>
             </a:r>
-            <a:endParaRPr lang="en-US" b="1" dirty="0"/>
           </a:p>
         </p:txBody>
       </p:sp>
@@ -5986,11 +5751,11 @@
               <a:buChar char="•"/>
             </a:pPr>
             <a:r>
-              <a:rPr lang="en-US" sz="3000" b="1" dirty="0" smtClean="0"/>
+              <a:rPr lang="en-US" sz="3000" b="1" dirty="0"/>
               <a:t>Team Leader/Project Manager</a:t>
             </a:r>
             <a:r>
-              <a:rPr lang="en-US" sz="3000" dirty="0" smtClean="0"/>
+              <a:rPr lang="en-US" sz="3000" dirty="0"/>
               <a:t> – Eliseo</a:t>
             </a:r>
           </a:p>
@@ -6003,11 +5768,11 @@
               <a:buChar char="•"/>
             </a:pPr>
             <a:r>
-              <a:rPr lang="en-US" sz="3000" b="1" dirty="0" smtClean="0"/>
+              <a:rPr lang="en-US" sz="3000" b="1" dirty="0"/>
               <a:t>Client-side Developer</a:t>
             </a:r>
             <a:r>
-              <a:rPr lang="en-US" sz="3000" dirty="0" smtClean="0"/>
+              <a:rPr lang="en-US" sz="3000" dirty="0"/>
               <a:t> – Jennifer, Andrea</a:t>
             </a:r>
           </a:p>
@@ -6020,11 +5785,11 @@
               <a:buChar char="•"/>
             </a:pPr>
             <a:r>
-              <a:rPr lang="en-US" sz="3000" b="1" dirty="0" smtClean="0"/>
+              <a:rPr lang="en-US" sz="3000" b="1" dirty="0"/>
               <a:t>Server-side Developer</a:t>
             </a:r>
             <a:r>
-              <a:rPr lang="en-US" sz="3000" dirty="0" smtClean="0"/>
+              <a:rPr lang="en-US" sz="3000" dirty="0"/>
               <a:t> – Jennifer, Alex, Eliseo</a:t>
             </a:r>
           </a:p>
@@ -6037,11 +5802,11 @@
               <a:buChar char="•"/>
             </a:pPr>
             <a:r>
-              <a:rPr lang="en-US" sz="3000" b="1" dirty="0" smtClean="0"/>
+              <a:rPr lang="en-US" sz="3000" b="1" dirty="0"/>
               <a:t>Database Manager</a:t>
             </a:r>
             <a:r>
-              <a:rPr lang="en-US" sz="3000" dirty="0" smtClean="0"/>
+              <a:rPr lang="en-US" sz="3000" dirty="0"/>
               <a:t> – Eliseo, Clark</a:t>
             </a:r>
           </a:p>
@@ -6054,11 +5819,11 @@
               <a:buChar char="•"/>
             </a:pPr>
             <a:r>
-              <a:rPr lang="en-US" sz="3000" b="1" dirty="0" smtClean="0"/>
+              <a:rPr lang="en-US" sz="3000" b="1" dirty="0"/>
               <a:t>UI/UX Design Manager</a:t>
             </a:r>
             <a:r>
-              <a:rPr lang="en-US" sz="3000" dirty="0" smtClean="0"/>
+              <a:rPr lang="en-US" sz="3000" dirty="0"/>
               <a:t> – Alex, Jennifer</a:t>
             </a:r>
           </a:p>
@@ -6071,11 +5836,11 @@
               <a:buChar char="•"/>
             </a:pPr>
             <a:r>
-              <a:rPr lang="en-US" sz="3000" b="1" dirty="0" smtClean="0"/>
+              <a:rPr lang="en-US" sz="3000" b="1" dirty="0"/>
               <a:t>Test Manager</a:t>
             </a:r>
             <a:r>
-              <a:rPr lang="en-US" sz="3000" dirty="0" smtClean="0"/>
+              <a:rPr lang="en-US" sz="3000" dirty="0"/>
               <a:t> – Eliseo, Clark</a:t>
             </a:r>
           </a:p>
@@ -6088,14 +5853,13 @@
               <a:buChar char="•"/>
             </a:pPr>
             <a:r>
-              <a:rPr lang="en-US" sz="3000" b="1" dirty="0" smtClean="0"/>
+              <a:rPr lang="en-US" sz="3000" b="1" dirty="0"/>
               <a:t>Business Analyst/Requirements Manager</a:t>
             </a:r>
             <a:r>
-              <a:rPr lang="en-US" sz="3000" dirty="0" smtClean="0"/>
+              <a:rPr lang="en-US" sz="3000" dirty="0"/>
               <a:t> – Andrea, Clark</a:t>
             </a:r>
-            <a:endParaRPr lang="en-US" sz="3000" dirty="0"/>
           </a:p>
         </p:txBody>
       </p:sp>
@@ -6109,13 +5873,6 @@
   <p:clrMapOvr>
     <a:masterClrMapping/>
   </p:clrMapOvr>
-  <p:timing>
-    <p:tnLst>
-      <p:par>
-        <p:cTn id="1" dur="indefinite" restart="never" nodeType="tmRoot"/>
-      </p:par>
-    </p:tnLst>
-  </p:timing>
 </p:sld>
 </file>
 
@@ -6180,10 +5937,9 @@
               </a:spcBef>
             </a:pPr>
             <a:r>
-              <a:rPr lang="en-US" sz="4400" b="1" dirty="0" smtClean="0"/>
+              <a:rPr lang="en-US" sz="4400" b="1" dirty="0"/>
               <a:t>Investigation of the Website</a:t>
             </a:r>
-            <a:endParaRPr lang="en-US" sz="4400" b="1" dirty="0"/>
           </a:p>
         </p:txBody>
       </p:sp>
@@ -6218,11 +5974,7 @@
             </a:pPr>
             <a:r>
               <a:rPr lang="en-US" sz="3200" dirty="0"/>
-              <a:t>Existence of unnecessary </a:t>
-            </a:r>
-            <a:r>
-              <a:rPr lang="en-US" sz="3200" dirty="0" smtClean="0"/>
-              <a:t>accounts</a:t>
+              <a:t>Existence of unnecessary accounts</a:t>
             </a:r>
           </a:p>
           <a:p>
@@ -6235,15 +5987,7 @@
             </a:pPr>
             <a:r>
               <a:rPr lang="en-US" sz="2400" dirty="0"/>
-              <a:t>Some </a:t>
-            </a:r>
-            <a:r>
-              <a:rPr lang="en-US" sz="2400" dirty="0" smtClean="0"/>
-              <a:t>accounts </a:t>
-            </a:r>
-            <a:r>
-              <a:rPr lang="en-US" sz="2400" dirty="0"/>
-              <a:t>may be removed if the Friends of Smithgall Woods agree that they are unnecessary</a:t>
+              <a:t>Some accounts may be removed if the Friends of Smithgall Woods agree that they are unnecessary</a:t>
             </a:r>
           </a:p>
           <a:p>
@@ -6255,7 +5999,7 @@
               <a:buChar char="•"/>
             </a:pPr>
             <a:r>
-              <a:rPr lang="en-US" sz="3000" dirty="0" smtClean="0"/>
+              <a:rPr lang="en-US" sz="3000" dirty="0"/>
               <a:t>Outdated Plugins</a:t>
             </a:r>
           </a:p>
@@ -6268,7 +6012,7 @@
               <a:buChar char="•"/>
             </a:pPr>
             <a:r>
-              <a:rPr lang="en-US" sz="3000" dirty="0" smtClean="0"/>
+              <a:rPr lang="en-US" sz="3000" dirty="0"/>
               <a:t>Malicious injected code with hidden links</a:t>
             </a:r>
           </a:p>
@@ -6282,19 +6026,7 @@
             </a:pPr>
             <a:r>
               <a:rPr lang="en-US" sz="2400" dirty="0"/>
-              <a:t>C</a:t>
-            </a:r>
-            <a:r>
-              <a:rPr lang="en-US" sz="2400" dirty="0" smtClean="0"/>
-              <a:t>ommon </a:t>
-            </a:r>
-            <a:r>
-              <a:rPr lang="en-US" sz="2400" dirty="0"/>
-              <a:t>problem in WordPress versions 2.8x and attackers are able to get into the \wp-admin\upload.php file and insert files on the </a:t>
-            </a:r>
-            <a:r>
-              <a:rPr lang="en-US" sz="2400" dirty="0" smtClean="0"/>
-              <a:t>server</a:t>
+              <a:t>Common problem in WordPress versions 2.8x and attackers are able to get into the \wp-admin\upload.php file and insert files on the server</a:t>
             </a:r>
           </a:p>
           <a:p>
@@ -6309,7 +6041,6 @@
               <a:rPr lang="en-US" sz="2400" dirty="0"/>
               <a:t>A base64_decode on the second line of the \wp-includes\locale.php file was found and identified as part of the injected malicious code that triggers the “cialis” messages with external web links to be displayed in multiple site pages</a:t>
             </a:r>
-            <a:endParaRPr lang="en-US" sz="2400" dirty="0" smtClean="0"/>
           </a:p>
         </p:txBody>
       </p:sp>
@@ -6323,13 +6054,6 @@
   <p:clrMapOvr>
     <a:masterClrMapping/>
   </p:clrMapOvr>
-  <p:timing>
-    <p:tnLst>
-      <p:par>
-        <p:cTn id="1" dur="indefinite" restart="never" nodeType="tmRoot"/>
-      </p:par>
-    </p:tnLst>
-  </p:timing>
 </p:sld>
 </file>
 
@@ -6394,10 +6118,9 @@
               </a:spcBef>
             </a:pPr>
             <a:r>
-              <a:rPr lang="en-US" sz="4400" b="1" dirty="0" smtClean="0"/>
+              <a:rPr lang="en-US" sz="4400" b="1" dirty="0"/>
               <a:t>Proposed Solutions to Security Vulnerability</a:t>
             </a:r>
-            <a:endParaRPr lang="en-US" sz="4400" b="1" dirty="0"/>
           </a:p>
         </p:txBody>
       </p:sp>
@@ -6410,7 +6133,7 @@
         <p:spPr>
           <a:xfrm>
             <a:off x="228600" y="1524000"/>
-            <a:ext cx="8839200" cy="5186035"/>
+            <a:ext cx="8839200" cy="5124480"/>
           </a:xfrm>
           <a:prstGeom prst="rect">
             <a:avLst/>
@@ -6431,24 +6154,8 @@
               <a:buChar char="•"/>
             </a:pPr>
             <a:r>
-              <a:rPr lang="en-US" sz="2800" dirty="0" smtClean="0"/>
-              <a:t>Delete </a:t>
-            </a:r>
-            <a:r>
               <a:rPr lang="en-US" sz="2800" dirty="0"/>
-              <a:t>the malicious </a:t>
-            </a:r>
-            <a:r>
-              <a:rPr lang="en-US" sz="2800" dirty="0" smtClean="0"/>
-              <a:t>injected code </a:t>
-            </a:r>
-            <a:r>
-              <a:rPr lang="en-US" sz="2800" dirty="0"/>
-              <a:t>from the </a:t>
-            </a:r>
-            <a:r>
-              <a:rPr lang="en-US" sz="2800" dirty="0" smtClean="0"/>
-              <a:t>file </a:t>
+              <a:t>Delete the malicious injected code from the file </a:t>
             </a:r>
           </a:p>
           <a:p>
@@ -6461,11 +6168,7 @@
             </a:pPr>
             <a:r>
               <a:rPr lang="en-US" sz="2400" dirty="0"/>
-              <a:t>Commenting the injected code out prevents the “Cialis” messages with hyperlinks from being displayed throughout the </a:t>
-            </a:r>
-            <a:r>
-              <a:rPr lang="en-US" sz="2400" dirty="0" smtClean="0"/>
-              <a:t>site</a:t>
+              <a:t>Commenting the injected code out prevents the “Cialis” messages with hyperlinks from being displayed throughout the site</a:t>
             </a:r>
           </a:p>
           <a:p>
@@ -6477,24 +6180,8 @@
               <a:buChar char="•"/>
             </a:pPr>
             <a:r>
-              <a:rPr lang="en-US" sz="2800" dirty="0" smtClean="0"/>
-              <a:t>Update </a:t>
-            </a:r>
-            <a:r>
               <a:rPr lang="en-US" sz="2800" dirty="0"/>
-              <a:t>plugins &amp;</a:t>
-            </a:r>
-            <a:r>
-              <a:rPr lang="en-US" sz="2800" dirty="0" smtClean="0"/>
-              <a:t> </a:t>
-            </a:r>
-            <a:r>
-              <a:rPr lang="en-US" sz="2800" dirty="0"/>
-              <a:t>software to suggested </a:t>
-            </a:r>
-            <a:r>
-              <a:rPr lang="en-US" sz="2800" dirty="0" smtClean="0"/>
-              <a:t>versions</a:t>
+              <a:t>Update plugins &amp; software to suggested versions</a:t>
             </a:r>
           </a:p>
           <a:p>
@@ -6506,18 +6193,9 @@
               <a:buChar char="•"/>
             </a:pPr>
             <a:r>
-              <a:rPr lang="en-US" sz="2800" dirty="0" smtClean="0"/>
-              <a:t>Remove </a:t>
-            </a:r>
-            <a:r>
               <a:rPr lang="en-US" sz="2800" dirty="0"/>
-              <a:t>unnecessary </a:t>
-            </a:r>
-            <a:r>
-              <a:rPr lang="en-US" sz="2800" dirty="0" smtClean="0"/>
-              <a:t>accounts</a:t>
-            </a:r>
-            <a:endParaRPr lang="en-US" sz="2800" dirty="0"/>
+              <a:t>Remove unnecessary accounts</a:t>
+            </a:r>
           </a:p>
           <a:p>
             <a:pPr marL="287338" lvl="0" indent="-287338">
@@ -6528,16 +6206,8 @@
               <a:buChar char="•"/>
             </a:pPr>
             <a:r>
-              <a:rPr lang="en-US" sz="2800" dirty="0" smtClean="0"/>
-              <a:t>Change </a:t>
-            </a:r>
-            <a:r>
               <a:rPr lang="en-US" sz="2800" dirty="0"/>
-              <a:t>the passwords for all remaining </a:t>
-            </a:r>
-            <a:r>
-              <a:rPr lang="en-US" sz="2800" dirty="0" smtClean="0"/>
-              <a:t>accounts</a:t>
+              <a:t>Change the passwords for all remaining accounts</a:t>
             </a:r>
           </a:p>
           <a:p>
@@ -6550,83 +6220,48 @@
             </a:pPr>
             <a:r>
               <a:rPr lang="en-US" sz="2800" dirty="0"/>
-              <a:t>Recommend using Java &amp;</a:t>
-            </a:r>
-            <a:r>
-              <a:rPr lang="en-US" sz="2800" dirty="0" smtClean="0"/>
-              <a:t> </a:t>
-            </a:r>
+              <a:t>Use hosting website’s security app to prevent further issues</a:t>
+            </a:r>
+          </a:p>
+          <a:p>
+            <a:pPr marL="744538" lvl="1" indent="-287338">
+              <a:spcBef>
+                <a:spcPts val="600"/>
+              </a:spcBef>
+              <a:buFont typeface="Arial" panose="020B0604020202020204" pitchFamily="34" charset="0"/>
+              <a:buChar char="•"/>
+            </a:pPr>
+            <a:r>
+              <a:rPr lang="en-US" sz="2400" dirty="0"/>
+              <a:t>1&amp;1 </a:t>
+            </a:r>
+            <a:r>
+              <a:rPr lang="en-US" sz="2400" dirty="0" err="1"/>
+              <a:t>SiteLock</a:t>
+            </a:r>
+            <a:r>
+              <a:rPr lang="en-US" sz="2400" dirty="0"/>
+              <a:t> (Basic or Premium Subscription)</a:t>
+            </a:r>
+            <a:endParaRPr lang="en-US" sz="2800" dirty="0"/>
+          </a:p>
+          <a:p>
+            <a:pPr marL="287338" lvl="0" indent="-287338">
+              <a:spcBef>
+                <a:spcPts val="600"/>
+              </a:spcBef>
+              <a:buFont typeface="Arial" panose="020B0604020202020204" pitchFamily="34" charset="0"/>
+              <a:buChar char="•"/>
+            </a:pPr>
             <a:r>
               <a:rPr lang="en-US" sz="2800" dirty="0"/>
-              <a:t>JavaScript for rebuilding the </a:t>
-            </a:r>
-            <a:r>
-              <a:rPr lang="en-US" sz="2800" dirty="0" smtClean="0"/>
-              <a:t>site</a:t>
+              <a:t>Recommend using Java &amp; JavaScript for rebuilding the site</a:t>
             </a:r>
             <a:endParaRPr lang="en-US" sz="2800" dirty="0">
               <a:solidFill>
                 <a:prstClr val="black"/>
               </a:solidFill>
             </a:endParaRPr>
-          </a:p>
-          <a:p>
-            <a:pPr marL="287338" lvl="0" indent="-287338">
-              <a:spcBef>
-                <a:spcPts val="600"/>
-              </a:spcBef>
-              <a:buFont typeface="Arial" panose="020B0604020202020204" pitchFamily="34" charset="0"/>
-              <a:buChar char="•"/>
-            </a:pPr>
-            <a:r>
-              <a:rPr lang="en-US" sz="2800" dirty="0"/>
-              <a:t>Use </a:t>
-            </a:r>
-            <a:r>
-              <a:rPr lang="en-US" sz="2800" dirty="0" smtClean="0"/>
-              <a:t>hosting </a:t>
-            </a:r>
-            <a:r>
-              <a:rPr lang="en-US" sz="2800" dirty="0"/>
-              <a:t>website’s security </a:t>
-            </a:r>
-            <a:r>
-              <a:rPr lang="en-US" sz="2800" dirty="0" smtClean="0"/>
-              <a:t>app </a:t>
-            </a:r>
-            <a:r>
-              <a:rPr lang="en-US" sz="2800" dirty="0"/>
-              <a:t>to </a:t>
-            </a:r>
-            <a:r>
-              <a:rPr lang="en-US" sz="2800" dirty="0" smtClean="0"/>
-              <a:t>prevent </a:t>
-            </a:r>
-            <a:r>
-              <a:rPr lang="en-US" sz="2800" dirty="0"/>
-              <a:t>further </a:t>
-            </a:r>
-            <a:r>
-              <a:rPr lang="en-US" sz="2800" dirty="0" smtClean="0"/>
-              <a:t>issues</a:t>
-            </a:r>
-          </a:p>
-          <a:p>
-            <a:pPr marL="744538" lvl="1" indent="-287338">
-              <a:spcBef>
-                <a:spcPts val="600"/>
-              </a:spcBef>
-              <a:buFont typeface="Arial" panose="020B0604020202020204" pitchFamily="34" charset="0"/>
-              <a:buChar char="•"/>
-            </a:pPr>
-            <a:r>
-              <a:rPr lang="en-US" sz="2400" dirty="0"/>
-              <a:t>1&amp;1 </a:t>
-            </a:r>
-            <a:r>
-              <a:rPr lang="en-US" sz="2400" dirty="0" smtClean="0"/>
-              <a:t>SiteLock (Basic or Premium Subscription)</a:t>
-            </a:r>
           </a:p>
         </p:txBody>
       </p:sp>
@@ -6640,13 +6275,6 @@
   <p:clrMapOvr>
     <a:masterClrMapping/>
   </p:clrMapOvr>
-  <p:timing>
-    <p:tnLst>
-      <p:par>
-        <p:cTn id="1" dur="indefinite" restart="never" nodeType="tmRoot"/>
-      </p:par>
-    </p:tnLst>
-  </p:timing>
 </p:sld>
 </file>
 
@@ -6766,13 +6394,8 @@
             </a:r>
             <a:r>
               <a:rPr lang="en-US" dirty="0"/>
-              <a:t>:  All hyperlinks shall be active, correct, and current</a:t>
-            </a:r>
-            <a:r>
-              <a:rPr lang="en-US" dirty="0" smtClean="0"/>
-              <a:t>.</a:t>
-            </a:r>
-            <a:endParaRPr lang="en-US" dirty="0"/>
+              <a:t>:  All hyperlinks shall be active, correct, and current.</a:t>
+            </a:r>
           </a:p>
         </p:txBody>
       </p:sp>
@@ -6812,7 +6435,7 @@
               <a:defRPr/>
             </a:pPr>
             <a:r>
-              <a:rPr lang="en-US" sz="4800" b="1" kern="1200" dirty="0" smtClean="0">
+              <a:rPr lang="en-US" sz="4800" b="1" kern="1200" dirty="0">
                 <a:solidFill>
                   <a:prstClr val="black"/>
                 </a:solidFill>
@@ -6823,7 +6446,7 @@
               <a:t>Suggested </a:t>
             </a:r>
             <a:r>
-              <a:rPr kumimoji="0" lang="en-US" sz="4800" b="1" i="0" u="none" strike="noStrike" kern="1200" cap="none" spc="0" normalizeH="0" baseline="0" noProof="0" dirty="0" smtClean="0">
+              <a:rPr kumimoji="0" lang="en-US" sz="4800" b="1" i="0" u="none" strike="noStrike" kern="1200" cap="none" spc="0" normalizeH="0" baseline="0" noProof="0" dirty="0">
                 <a:ln>
                   <a:noFill/>
                 </a:ln>
@@ -6853,13 +6476,6 @@
   <p:clrMapOvr>
     <a:masterClrMapping/>
   </p:clrMapOvr>
-  <p:timing>
-    <p:tnLst>
-      <p:par>
-        <p:cTn id="1" dur="indefinite" restart="never" nodeType="tmRoot"/>
-      </p:par>
-    </p:tnLst>
-  </p:timing>
 </p:sld>
 </file>
 
@@ -6916,7 +6532,7 @@
               <a:defRPr/>
             </a:pPr>
             <a:r>
-              <a:rPr kumimoji="0" lang="en-US" sz="3600" b="1" i="0" u="none" strike="noStrike" kern="1200" cap="none" spc="0" normalizeH="0" baseline="0" noProof="0" dirty="0" smtClean="0">
+              <a:rPr kumimoji="0" lang="en-US" sz="3600" b="1" i="0" u="none" strike="noStrike" kern="1200" cap="none" spc="0" normalizeH="0" baseline="0" noProof="0" dirty="0">
                 <a:ln>
                   <a:noFill/>
                 </a:ln>
@@ -7050,13 +6666,6 @@
   <p:clrMapOvr>
     <a:masterClrMapping/>
   </p:clrMapOvr>
-  <p:timing>
-    <p:tnLst>
-      <p:par>
-        <p:cTn id="1" dur="indefinite" restart="never" nodeType="tmRoot"/>
-      </p:par>
-    </p:tnLst>
-  </p:timing>
 </p:sld>
 </file>
 
@@ -7172,7 +6781,7 @@
               <a:defRPr/>
             </a:pPr>
             <a:r>
-              <a:rPr kumimoji="0" lang="en-US" sz="3600" b="1" i="0" u="none" strike="noStrike" kern="1200" cap="none" spc="0" normalizeH="0" baseline="0" noProof="0" dirty="0" smtClean="0">
+              <a:rPr kumimoji="0" lang="en-US" sz="3600" b="1" i="0" u="none" strike="noStrike" kern="1200" cap="none" spc="0" normalizeH="0" baseline="0" noProof="0" dirty="0">
                 <a:ln>
                   <a:noFill/>
                 </a:ln>
@@ -7202,13 +6811,6 @@
   <p:clrMapOvr>
     <a:masterClrMapping/>
   </p:clrMapOvr>
-  <p:timing>
-    <p:tnLst>
-      <p:par>
-        <p:cTn id="1" dur="indefinite" restart="never" nodeType="tmRoot"/>
-      </p:par>
-    </p:tnLst>
-  </p:timing>
 </p:sld>
 </file>
 
@@ -7265,7 +6867,7 @@
               <a:defRPr/>
             </a:pPr>
             <a:r>
-              <a:rPr kumimoji="0" lang="en-US" sz="3600" b="1" i="0" u="none" strike="noStrike" kern="1200" cap="none" spc="0" normalizeH="0" baseline="0" noProof="0" dirty="0" smtClean="0">
+              <a:rPr kumimoji="0" lang="en-US" sz="3600" b="1" i="0" u="none" strike="noStrike" kern="1200" cap="none" spc="0" normalizeH="0" baseline="0" noProof="0" dirty="0">
                 <a:ln>
                   <a:noFill/>
                 </a:ln>
@@ -7328,13 +6930,6 @@
   <p:clrMapOvr>
     <a:masterClrMapping/>
   </p:clrMapOvr>
-  <p:timing>
-    <p:tnLst>
-      <p:par>
-        <p:cTn id="1" dur="indefinite" restart="never" nodeType="tmRoot"/>
-      </p:par>
-    </p:tnLst>
-  </p:timing>
 </p:sld>
 </file>
 

</xml_diff>

<commit_message>
Updated wording on slide 4
</commit_message>
<xml_diff>
--- a/Smithgall Woods Project Update 20Sep17.pptx
+++ b/Smithgall Woods Project Update 20Sep17.pptx
@@ -6000,8 +6000,13 @@
             </a:pPr>
             <a:r>
               <a:rPr lang="en-US" sz="3000" dirty="0"/>
-              <a:t>Outdated Plugins</a:t>
-            </a:r>
+              <a:t>Outdated </a:t>
+            </a:r>
+            <a:r>
+              <a:rPr lang="en-US" sz="3000"/>
+              <a:t>software and plugins</a:t>
+            </a:r>
+            <a:endParaRPr lang="en-US" sz="3000" dirty="0"/>
           </a:p>
           <a:p>
             <a:pPr marL="287338" indent="-287338">

</xml_diff>